<commit_message>
Leichte Korrektur der Planungspräsentation
</commit_message>
<xml_diff>
--- a/Planungspraesentation-Mitte Juni/Planungspräsentation VálaKathi. 1.pptx
+++ b/Planungspraesentation-Mitte Juni/Planungspräsentation VálaKathi. 1.pptx
@@ -121,7 +121,7 @@
   </p:defaultTextStyle>
   <p:extLst>
     <p:ext uri="{EFAFB233-063F-42B5-8137-9DF3F51BA10A}">
-      <p15:sldGuideLst xmlns="" xmlns:p15="http://schemas.microsoft.com/office/powerpoint/2012/main">
+      <p15:sldGuideLst xmlns:p15="http://schemas.microsoft.com/office/powerpoint/2012/main">
         <p15:guide id="1" orient="horz" pos="2160">
           <p15:clr>
             <a:srgbClr val="A4A3A4"/>
@@ -220,7 +220,7 @@
           <a:p>
             <a:fld id="{B4FF162B-CE6F-6948-9E4E-CF339F017EF0}" type="datetime1">
               <a:rPr lang="de-DE" smtClean="0"/>
-              <a:t>28.06.15</a:t>
+              <a:t>30.06.2015</a:t>
             </a:fld>
             <a:endParaRPr lang="de-DE"/>
           </a:p>
@@ -386,7 +386,7 @@
           <a:p>
             <a:fld id="{F8F687C1-49B9-FC43-A5F5-4E2CAE8623DA}" type="datetime1">
               <a:rPr lang="de-DE" smtClean="0"/>
-              <a:t>28.06.15</a:t>
+              <a:t>30.06.2015</a:t>
             </a:fld>
             <a:endParaRPr lang="de-DE"/>
           </a:p>
@@ -920,7 +920,7 @@
           <a:p>
             <a:fld id="{1DACE3BB-339C-AD47-A52D-662320F7C205}" type="datetime1">
               <a:rPr lang="de-DE" smtClean="0"/>
-              <a:t>28.06.15</a:t>
+              <a:t>30.06.2015</a:t>
             </a:fld>
             <a:endParaRPr lang="de-DE"/>
           </a:p>
@@ -1090,7 +1090,7 @@
           <a:p>
             <a:fld id="{F42559F4-B3EB-344D-B633-69F007223D30}" type="datetime1">
               <a:rPr lang="de-DE" smtClean="0"/>
-              <a:t>28.06.15</a:t>
+              <a:t>30.06.2015</a:t>
             </a:fld>
             <a:endParaRPr lang="de-DE"/>
           </a:p>
@@ -1270,7 +1270,7 @@
           <a:p>
             <a:fld id="{42AF2205-F992-9F41-987F-7238F8B9F0B5}" type="datetime1">
               <a:rPr lang="de-DE" smtClean="0"/>
-              <a:t>28.06.15</a:t>
+              <a:t>30.06.2015</a:t>
             </a:fld>
             <a:endParaRPr lang="de-DE"/>
           </a:p>
@@ -1440,7 +1440,7 @@
           <a:p>
             <a:fld id="{FF84A754-A284-FB40-B909-6C25294AD20F}" type="datetime1">
               <a:rPr lang="de-DE" smtClean="0"/>
-              <a:t>28.06.15</a:t>
+              <a:t>30.06.2015</a:t>
             </a:fld>
             <a:endParaRPr lang="de-DE"/>
           </a:p>
@@ -1686,7 +1686,7 @@
           <a:p>
             <a:fld id="{CA605955-6352-BD4C-B0F3-ECEE8C6EE720}" type="datetime1">
               <a:rPr lang="de-DE" smtClean="0"/>
-              <a:t>28.06.15</a:t>
+              <a:t>30.06.2015</a:t>
             </a:fld>
             <a:endParaRPr lang="de-DE"/>
           </a:p>
@@ -1974,7 +1974,7 @@
           <a:p>
             <a:fld id="{C86AEEF6-0385-0844-9861-D3417F6C1E98}" type="datetime1">
               <a:rPr lang="de-DE" smtClean="0"/>
-              <a:t>28.06.15</a:t>
+              <a:t>30.06.2015</a:t>
             </a:fld>
             <a:endParaRPr lang="de-DE"/>
           </a:p>
@@ -2396,7 +2396,7 @@
           <a:p>
             <a:fld id="{84A495D8-31AC-6141-A708-923E383D2969}" type="datetime1">
               <a:rPr lang="de-DE" smtClean="0"/>
-              <a:t>28.06.15</a:t>
+              <a:t>30.06.2015</a:t>
             </a:fld>
             <a:endParaRPr lang="de-DE"/>
           </a:p>
@@ -2514,7 +2514,7 @@
           <a:p>
             <a:fld id="{6B9BBFBE-94A6-EE41-BDE2-C36DF8BDD6AC}" type="datetime1">
               <a:rPr lang="de-DE" smtClean="0"/>
-              <a:t>28.06.15</a:t>
+              <a:t>30.06.2015</a:t>
             </a:fld>
             <a:endParaRPr lang="de-DE"/>
           </a:p>
@@ -2609,7 +2609,7 @@
           <a:p>
             <a:fld id="{8A3BDDF1-32E1-AA48-AD7E-B28DB9397AA4}" type="datetime1">
               <a:rPr lang="de-DE" smtClean="0"/>
-              <a:t>28.06.15</a:t>
+              <a:t>30.06.2015</a:t>
             </a:fld>
             <a:endParaRPr lang="de-DE"/>
           </a:p>
@@ -2886,7 +2886,7 @@
           <a:p>
             <a:fld id="{BF30ED29-63A2-654D-9D7C-1CB6D6E00183}" type="datetime1">
               <a:rPr lang="de-DE" smtClean="0"/>
-              <a:t>28.06.15</a:t>
+              <a:t>30.06.2015</a:t>
             </a:fld>
             <a:endParaRPr lang="de-DE"/>
           </a:p>
@@ -3139,7 +3139,7 @@
           <a:p>
             <a:fld id="{4FB359BF-9004-C740-93E9-376A57F77EA5}" type="datetime1">
               <a:rPr lang="de-DE" smtClean="0"/>
-              <a:t>28.06.15</a:t>
+              <a:t>30.06.2015</a:t>
             </a:fld>
             <a:endParaRPr lang="de-DE"/>
           </a:p>
@@ -3352,7 +3352,7 @@
           <a:p>
             <a:fld id="{88615D7D-6342-384A-A16F-53E369E57F7B}" type="datetime1">
               <a:rPr lang="de-DE" smtClean="0"/>
-              <a:t>28.06.15</a:t>
+              <a:t>30.06.2015</a:t>
             </a:fld>
             <a:endParaRPr lang="de-DE"/>
           </a:p>
@@ -4828,7 +4828,7 @@
             <p:ph idx="1"/>
             <p:extLst>
               <p:ext uri="{D42A27DB-BD31-4B8C-83A1-F6EECF244321}">
-                <p14:modId xmlns:p14="http://schemas.microsoft.com/office/powerpoint/2010/main" val="4162589113"/>
+                <p14:modId xmlns:p14="http://schemas.microsoft.com/office/powerpoint/2010/main" val="3772294196"/>
               </p:ext>
             </p:extLst>
           </p:nvPr>
@@ -4943,29 +4943,36 @@
                     <a:p>
                       <a:r>
                         <a:rPr lang="de-DE" dirty="0" smtClean="0"/>
-                        <a:t>-Spielwelt</a:t>
-                      </a:r>
-                    </a:p>
-                    <a:p>
-                      <a:r>
-                        <a:rPr lang="de-DE" dirty="0" smtClean="0"/>
-                        <a:t>-Kamera</a:t>
-                      </a:r>
-                    </a:p>
-                    <a:p>
-                      <a:r>
-                        <a:rPr lang="de-DE" dirty="0" smtClean="0"/>
-                        <a:t>-Licht/Schatten</a:t>
-                      </a:r>
-                    </a:p>
-                    <a:p>
-                      <a:r>
-                        <a:rPr lang="de-DE" dirty="0" smtClean="0"/>
-                        <a:t>-Essen</a:t>
+                        <a:t>-  Spielwelt</a:t>
+                      </a:r>
+                      <a:endParaRPr lang="de-DE" dirty="0" smtClean="0"/>
+                    </a:p>
+                    <a:p>
+                      <a:r>
+                        <a:rPr lang="de-DE" dirty="0" smtClean="0"/>
+                        <a:t>-  Kamera</a:t>
+                      </a:r>
+                      <a:endParaRPr lang="de-DE" dirty="0" smtClean="0"/>
+                    </a:p>
+                    <a:p>
+                      <a:r>
+                        <a:rPr lang="de-DE" dirty="0" smtClean="0"/>
+                        <a:t>-  Licht/Schatten</a:t>
+                      </a:r>
+                      <a:endParaRPr lang="de-DE" dirty="0" smtClean="0"/>
+                    </a:p>
+                    <a:p>
+                      <a:r>
+                        <a:rPr lang="de-DE" dirty="0" smtClean="0"/>
+                        <a:t>-  Essen</a:t>
                       </a:r>
                       <a:r>
                         <a:rPr lang="de-DE" baseline="0" dirty="0" smtClean="0"/>
-                        <a:t> erscheint </a:t>
+                        <a:t> </a:t>
+                      </a:r>
+                      <a:r>
+                        <a:rPr lang="de-DE" baseline="0" dirty="0" smtClean="0"/>
+                        <a:t>erscheint </a:t>
                       </a:r>
                       <a:endParaRPr lang="de-DE" dirty="0"/>
                     </a:p>
@@ -4979,11 +4986,23 @@
                     <a:p>
                       <a:r>
                         <a:rPr lang="de-DE" dirty="0" smtClean="0"/>
-                        <a:t>- Navigation/Steuerung</a:t>
+                        <a:t>-  Navigation/</a:t>
+                      </a:r>
+                    </a:p>
+                    <a:p>
+                      <a:r>
+                        <a:rPr lang="de-DE" dirty="0" smtClean="0"/>
+                        <a:t>   Steuerung</a:t>
                       </a:r>
                       <a:r>
                         <a:rPr lang="de-DE" baseline="0" dirty="0" smtClean="0"/>
-                        <a:t> eines Würfels </a:t>
+                        <a:t> eines</a:t>
+                      </a:r>
+                    </a:p>
+                    <a:p>
+                      <a:r>
+                        <a:rPr lang="de-DE" baseline="0" dirty="0" smtClean="0"/>
+                        <a:t>   Würfels </a:t>
                       </a:r>
                       <a:endParaRPr lang="de-DE" dirty="0"/>
                     </a:p>
@@ -5082,13 +5101,7 @@
                         <a:rPr lang="de-DE" dirty="0" smtClean="0">
                           <a:effectLst/>
                         </a:rPr>
-                        <a:t> .</a:t>
-                      </a:r>
-                      <a:r>
-                        <a:rPr lang="de-DE" dirty="0" smtClean="0">
-                          <a:effectLst/>
-                        </a:rPr>
-                        <a:t>2015</a:t>
+                        <a:t> .2015</a:t>
                       </a:r>
                     </a:p>
                     <a:p>
@@ -5106,9 +5119,6 @@
                         </a:rPr>
                         <a:t>2.Teil</a:t>
                       </a:r>
-                      <a:endParaRPr lang="de-DE" dirty="0" smtClean="0">
-                        <a:effectLst/>
-                      </a:endParaRPr>
                     </a:p>
                     <a:p>
                       <a:r>
@@ -5147,8 +5157,27 @@
                       </a:r>
                       <a:r>
                         <a:rPr lang="de-DE" dirty="0" smtClean="0"/>
-                        <a:t> zählen/begrenzen</a:t>
-                      </a:r>
+                        <a:t> </a:t>
+                      </a:r>
+                      <a:r>
+                        <a:rPr lang="de-DE" dirty="0" smtClean="0"/>
+                        <a:t>zählen/</a:t>
+                      </a:r>
+                    </a:p>
+                    <a:p>
+                      <a:pPr marL="0" indent="0">
+                        <a:buFontTx/>
+                        <a:buNone/>
+                      </a:pPr>
+                      <a:r>
+                        <a:rPr lang="de-DE" baseline="0" dirty="0" smtClean="0"/>
+                        <a:t>      </a:t>
+                      </a:r>
+                      <a:r>
+                        <a:rPr lang="de-DE" dirty="0" smtClean="0"/>
+                        <a:t>begrenzen</a:t>
+                      </a:r>
+                      <a:endParaRPr lang="de-DE" dirty="0" smtClean="0"/>
                     </a:p>
                     <a:p>
                       <a:pPr marL="285750" indent="-285750">
@@ -5190,7 +5219,7 @@
                         <a:buChar char="-"/>
                       </a:pPr>
                       <a:r>
-                        <a:rPr lang="de-DE" dirty="0" err="1" smtClean="0"/>
+                        <a:rPr lang="de-DE" dirty="0" smtClean="0"/>
                         <a:t>Highscore</a:t>
                       </a:r>
                       <a:r>
@@ -5284,18 +5313,22 @@
                     <a:p>
                       <a:r>
                         <a:rPr lang="de-DE" dirty="0" smtClean="0"/>
-                        <a:t>-Level</a:t>
+                        <a:t>-   Level</a:t>
                       </a:r>
                       <a:r>
                         <a:rPr lang="de-DE" baseline="0" dirty="0" smtClean="0"/>
-                        <a:t> 1,6</a:t>
+                        <a:t> </a:t>
+                      </a:r>
+                      <a:r>
+                        <a:rPr lang="de-DE" baseline="0" dirty="0" smtClean="0"/>
+                        <a:t>1,6</a:t>
                       </a:r>
                       <a:endParaRPr lang="de-DE" dirty="0" smtClean="0"/>
                     </a:p>
                     <a:p>
                       <a:r>
                         <a:rPr lang="de-DE" dirty="0" smtClean="0"/>
-                        <a:t>-Bugfixing/</a:t>
+                        <a:t>-   Bugfixing/</a:t>
                       </a:r>
                       <a:r>
                         <a:rPr lang="de-DE" dirty="0" err="1" smtClean="0"/>
@@ -5313,18 +5346,22 @@
                     <a:p>
                       <a:r>
                         <a:rPr lang="de-DE" dirty="0" smtClean="0"/>
-                        <a:t>-Level</a:t>
+                        <a:t>-   Level</a:t>
                       </a:r>
                       <a:r>
                         <a:rPr lang="de-DE" baseline="0" dirty="0" smtClean="0"/>
-                        <a:t> 2,5</a:t>
+                        <a:t> </a:t>
+                      </a:r>
+                      <a:r>
+                        <a:rPr lang="de-DE" baseline="0" dirty="0" smtClean="0"/>
+                        <a:t>2,5</a:t>
                       </a:r>
                       <a:endParaRPr lang="de-DE" dirty="0" smtClean="0"/>
                     </a:p>
                     <a:p>
                       <a:r>
                         <a:rPr lang="de-DE" dirty="0" smtClean="0"/>
-                        <a:t>-Bugfixing </a:t>
+                        <a:t>-   Bugfixing </a:t>
                       </a:r>
                       <a:endParaRPr lang="de-DE" dirty="0"/>
                     </a:p>
@@ -5338,18 +5375,30 @@
                     <a:p>
                       <a:r>
                         <a:rPr lang="de-DE" dirty="0" smtClean="0"/>
-                        <a:t>- Level</a:t>
+                        <a:t>- </a:t>
+                      </a:r>
+                      <a:r>
+                        <a:rPr lang="de-DE" dirty="0" smtClean="0"/>
+                        <a:t>  Level</a:t>
                       </a:r>
                       <a:r>
                         <a:rPr lang="de-DE" baseline="0" dirty="0" smtClean="0"/>
-                        <a:t> 3,4</a:t>
+                        <a:t> </a:t>
+                      </a:r>
+                      <a:r>
+                        <a:rPr lang="de-DE" baseline="0" dirty="0" smtClean="0"/>
+                        <a:t>3,4</a:t>
                       </a:r>
                       <a:endParaRPr lang="de-DE" dirty="0" smtClean="0"/>
                     </a:p>
                     <a:p>
                       <a:r>
                         <a:rPr lang="de-DE" dirty="0" smtClean="0"/>
-                        <a:t>- Bugfixing</a:t>
+                        <a:t>- </a:t>
+                      </a:r>
+                      <a:r>
+                        <a:rPr lang="de-DE" dirty="0" smtClean="0"/>
+                        <a:t>  Bugfixing</a:t>
                       </a:r>
                       <a:r>
                         <a:rPr lang="de-DE" baseline="0" dirty="0" smtClean="0"/>
@@ -5458,7 +5507,7 @@
         </p:nvGraphicFramePr>
         <p:xfrm>
           <a:off x="457200" y="1600200"/>
-          <a:ext cx="8229600" cy="4033519"/>
+          <a:ext cx="8229600" cy="4033520"/>
         </p:xfrm>
         <a:graphic>
           <a:graphicData uri="http://schemas.openxmlformats.org/drawingml/2006/table">
@@ -5725,13 +5774,8 @@
                     <a:p>
                       <a:r>
                         <a:rPr lang="de-DE" baseline="0" dirty="0" smtClean="0"/>
-                        <a:t>-Konzept </a:t>
-                      </a:r>
-                      <a:r>
-                        <a:rPr lang="de-DE" baseline="0" dirty="0" err="1" smtClean="0"/>
-                        <a:t>Highscore</a:t>
-                      </a:r>
-                      <a:endParaRPr lang="de-DE" baseline="0" dirty="0" smtClean="0"/>
+                        <a:t>-Konzept Highscore</a:t>
+                      </a:r>
                     </a:p>
                     <a:p>
                       <a:endParaRPr lang="de-DE" dirty="0"/>
@@ -5817,13 +5861,8 @@
                       </a:r>
                       <a:r>
                         <a:rPr lang="de-DE" baseline="0" dirty="0" smtClean="0"/>
-                        <a:t> </a:t>
-                      </a:r>
-                      <a:r>
-                        <a:rPr lang="de-DE" baseline="0" dirty="0" err="1" smtClean="0"/>
-                        <a:t>Highscore</a:t>
-                      </a:r>
-                      <a:endParaRPr lang="de-DE" baseline="0" dirty="0" smtClean="0"/>
+                        <a:t> Highscore</a:t>
+                      </a:r>
                     </a:p>
                     <a:p>
                       <a:r>
@@ -5965,14 +6004,14 @@
             <p:ph idx="1"/>
             <p:extLst>
               <p:ext uri="{D42A27DB-BD31-4B8C-83A1-F6EECF244321}">
-                <p14:modId xmlns:p14="http://schemas.microsoft.com/office/powerpoint/2010/main" val="3227275157"/>
+                <p14:modId xmlns:p14="http://schemas.microsoft.com/office/powerpoint/2010/main" val="2184316949"/>
               </p:ext>
             </p:extLst>
           </p:nvPr>
         </p:nvGraphicFramePr>
         <p:xfrm>
           <a:off x="658426" y="1600200"/>
-          <a:ext cx="7812309" cy="2666999"/>
+          <a:ext cx="7812309" cy="3215640"/>
         </p:xfrm>
         <a:graphic>
           <a:graphicData uri="http://schemas.openxmlformats.org/drawingml/2006/table">
@@ -6135,7 +6174,11 @@
                     <a:p>
                       <a:r>
                         <a:rPr lang="de-DE" baseline="0" dirty="0" smtClean="0"/>
-                        <a:t> zur Gameinteraktion </a:t>
+                        <a:t> zum Spielfeld und der Schlange (</a:t>
+                      </a:r>
+                      <a:r>
+                        <a:rPr lang="de-DE" baseline="0" dirty="0" smtClean="0"/>
+                        <a:t>Grundgerüst und Spielfigur)</a:t>
                       </a:r>
                       <a:endParaRPr lang="de-DE" dirty="0"/>
                     </a:p>
@@ -6390,14 +6433,14 @@
             <p:ph idx="1"/>
             <p:extLst>
               <p:ext uri="{D42A27DB-BD31-4B8C-83A1-F6EECF244321}">
-                <p14:modId xmlns:p14="http://schemas.microsoft.com/office/powerpoint/2010/main" val="2158902424"/>
+                <p14:modId xmlns:p14="http://schemas.microsoft.com/office/powerpoint/2010/main" val="3013584268"/>
               </p:ext>
             </p:extLst>
           </p:nvPr>
         </p:nvGraphicFramePr>
         <p:xfrm>
           <a:off x="457200" y="1600200"/>
-          <a:ext cx="8229600" cy="3942079"/>
+          <a:ext cx="8229600" cy="3942080"/>
         </p:xfrm>
         <a:graphic>
           <a:graphicData uri="http://schemas.openxmlformats.org/drawingml/2006/table">
@@ -6533,7 +6576,25 @@
                     <a:p>
                       <a:r>
                         <a:rPr lang="de-DE" dirty="0" smtClean="0"/>
-                        <a:t>Erste Programmierung der Steuerung</a:t>
+                        <a:t>Erste Programmierung der </a:t>
+                      </a:r>
+                      <a:r>
+                        <a:rPr lang="de-DE" dirty="0" smtClean="0"/>
+                        <a:t>Steuerung</a:t>
+                      </a:r>
+                    </a:p>
+                    <a:p>
+                      <a:r>
+                        <a:rPr lang="de-DE" dirty="0" smtClean="0"/>
+                        <a:t>(Mit Würfel</a:t>
+                      </a:r>
+                      <a:r>
+                        <a:rPr lang="de-DE" baseline="0" dirty="0" smtClean="0"/>
+                        <a:t> als Versuchsobjekt</a:t>
+                      </a:r>
+                      <a:r>
+                        <a:rPr lang="de-DE" dirty="0" smtClean="0"/>
+                        <a:t>)</a:t>
                       </a:r>
                       <a:endParaRPr lang="de-DE" dirty="0"/>
                     </a:p>
@@ -6638,8 +6699,8 @@
                         <a:t>- Erste Überlegungen zum High </a:t>
                       </a:r>
                       <a:r>
-                        <a:rPr lang="de-DE" dirty="0" err="1" smtClean="0"/>
-                        <a:t>Scoure</a:t>
+                        <a:rPr lang="de-DE" dirty="0" smtClean="0"/>
+                        <a:t>Score</a:t>
                       </a:r>
                       <a:endParaRPr lang="de-DE" dirty="0"/>
                     </a:p>
@@ -6855,7 +6916,7 @@
         </p:nvGraphicFramePr>
         <p:xfrm>
           <a:off x="457200" y="1600200"/>
-          <a:ext cx="8229600" cy="2666999"/>
+          <a:ext cx="8229600" cy="2667000"/>
         </p:xfrm>
         <a:graphic>
           <a:graphicData uri="http://schemas.openxmlformats.org/drawingml/2006/table">

</xml_diff>